<commit_message>
Documentation; final ajustment at Console.
</commit_message>
<xml_diff>
--- a/docs/Presentation.pptx
+++ b/docs/Presentation.pptx
@@ -5,13 +5,14 @@
     <p:sldMasterId id="2147483669" r:id="rId4"/>
   </p:sldMasterIdLst>
   <p:notesMasterIdLst>
-    <p:notesMasterId r:id="rId9"/>
+    <p:notesMasterId r:id="rId10"/>
   </p:notesMasterIdLst>
   <p:sldIdLst>
     <p:sldId id="257" r:id="rId5"/>
-    <p:sldId id="258" r:id="rId6"/>
-    <p:sldId id="260" r:id="rId7"/>
-    <p:sldId id="261" r:id="rId8"/>
+    <p:sldId id="261" r:id="rId6"/>
+    <p:sldId id="264" r:id="rId7"/>
+    <p:sldId id="262" r:id="rId8"/>
+    <p:sldId id="263" r:id="rId9"/>
   </p:sldIdLst>
   <p:sldSz cx="12207875" cy="6858000"/>
   <p:notesSz cx="6797675" cy="9872663"/>
@@ -157,6 +158,10 @@
     </p:ext>
   </p:extLst>
 </p:presentation>
+</file>
+
+<file path=ppt/revisionInfo.xml><?xml version="1.0" encoding="utf-8"?>
+<p1510:revInfo xmlns:a="http://schemas.openxmlformats.org/drawingml/2006/main" xmlns:r="http://schemas.openxmlformats.org/officeDocument/2006/relationships" xmlns:p1510="http://schemas.microsoft.com/office/powerpoint/2015/10/main"/>
 </file>
 
 <file path=ppt/notesMasters/notesMaster1.xml><?xml version="1.0" encoding="utf-8"?>
@@ -6694,10 +6699,51 @@
           <a:lstStyle/>
           <a:p>
             <a:pPr eaLnBrk="1" hangingPunct="1"/>
+            <a:r>
+              <a:rPr lang="de-CH" dirty="0">
+                <a:latin typeface="Lucida Sans" pitchFamily="34" charset="0"/>
+                <a:cs typeface="Lucida Sans Unicode" pitchFamily="34" charset="0"/>
+              </a:rPr>
+              <a:t>Sentiment Analyse</a:t>
+            </a:r>
+          </a:p>
+          <a:p>
+            <a:pPr eaLnBrk="1" hangingPunct="1"/>
             <a:endParaRPr lang="de-CH" dirty="0">
               <a:latin typeface="Lucida Sans" pitchFamily="34" charset="0"/>
               <a:cs typeface="Lucida Sans Unicode" pitchFamily="34" charset="0"/>
             </a:endParaRPr>
+          </a:p>
+          <a:p>
+            <a:pPr eaLnBrk="1" hangingPunct="1"/>
+            <a:endParaRPr lang="de-CH" dirty="0">
+              <a:latin typeface="Lucida Sans" pitchFamily="34" charset="0"/>
+              <a:cs typeface="Lucida Sans Unicode" pitchFamily="34" charset="0"/>
+            </a:endParaRPr>
+          </a:p>
+          <a:p>
+            <a:pPr eaLnBrk="1" hangingPunct="1"/>
+            <a:endParaRPr lang="de-CH" dirty="0">
+              <a:latin typeface="Lucida Sans" pitchFamily="34" charset="0"/>
+              <a:cs typeface="Lucida Sans Unicode" pitchFamily="34" charset="0"/>
+            </a:endParaRPr>
+          </a:p>
+          <a:p>
+            <a:pPr eaLnBrk="1" hangingPunct="1"/>
+            <a:endParaRPr lang="de-CH" sz="1600" dirty="0">
+              <a:latin typeface="Lucida Sans" pitchFamily="34" charset="0"/>
+              <a:cs typeface="Lucida Sans Unicode" pitchFamily="34" charset="0"/>
+            </a:endParaRPr>
+          </a:p>
+          <a:p>
+            <a:pPr eaLnBrk="1" hangingPunct="1"/>
+            <a:r>
+              <a:rPr lang="de-CH" sz="1600" i="1" dirty="0">
+                <a:latin typeface="Lucida Sans" pitchFamily="34" charset="0"/>
+                <a:cs typeface="Lucida Sans Unicode" pitchFamily="34" charset="0"/>
+              </a:rPr>
+              <a:t>Nalet Meinen, Alexander Nussbaum, Michael Utz</a:t>
+            </a:r>
           </a:p>
         </p:txBody>
       </p:sp>
@@ -6749,9 +6795,12 @@
               <a:buFont typeface="Lucida Grande" charset="0"/>
               <a:buChar char="▶"/>
             </a:pPr>
-            <a:endParaRPr lang="de-CH">
-              <a:latin typeface="Lucida Sans" pitchFamily="34" charset="0"/>
-            </a:endParaRPr>
+            <a:r>
+              <a:rPr lang="de-CH" dirty="0">
+                <a:latin typeface="Lucida Sans" pitchFamily="34" charset="0"/>
+              </a:rPr>
+              <a:t>Technik und Informatik</a:t>
+            </a:r>
           </a:p>
         </p:txBody>
       </p:sp>
@@ -6782,7 +6831,7 @@
       </p:grpSpPr>
       <p:sp>
         <p:nvSpPr>
-          <p:cNvPr id="9218" name="Titel 1"/>
+          <p:cNvPr id="11266" name="Titel 1"/>
           <p:cNvSpPr>
             <a:spLocks noGrp="1"/>
           </p:cNvSpPr>
@@ -6792,8 +6841,8 @@
         </p:nvSpPr>
         <p:spPr bwMode="auto">
           <a:xfrm>
-            <a:off x="457200" y="1839913"/>
-            <a:ext cx="7019925" cy="533400"/>
+            <a:off x="457200" y="360363"/>
+            <a:ext cx="11249025" cy="539750"/>
           </a:xfrm>
           <a:noFill/>
           <a:extLst>
@@ -6825,27 +6874,29 @@
           <a:lstStyle/>
           <a:p>
             <a:pPr eaLnBrk="1" hangingPunct="1"/>
-            <a:endParaRPr lang="de-CH">
-              <a:latin typeface="Lucida Sans" pitchFamily="34" charset="0"/>
-              <a:cs typeface="Lucida Sans Unicode" pitchFamily="34" charset="0"/>
-            </a:endParaRPr>
-          </a:p>
-        </p:txBody>
-      </p:sp>
-      <p:sp>
-        <p:nvSpPr>
-          <p:cNvPr id="9219" name="Untertitel 2"/>
+            <a:r>
+              <a:rPr lang="de-CH" dirty="0">
+                <a:latin typeface="Lucida Sans" pitchFamily="34" charset="0"/>
+              </a:rPr>
+              <a:t>Umsetzung</a:t>
+            </a:r>
+          </a:p>
+        </p:txBody>
+      </p:sp>
+      <p:sp>
+        <p:nvSpPr>
+          <p:cNvPr id="11267" name="Textplatzhalter 2"/>
           <p:cNvSpPr>
             <a:spLocks noGrp="1"/>
           </p:cNvSpPr>
           <p:nvPr>
-            <p:ph type="subTitle" idx="1"/>
+            <p:ph type="body" idx="1"/>
           </p:nvPr>
         </p:nvSpPr>
         <p:spPr bwMode="auto">
           <a:xfrm>
-            <a:off x="457200" y="2447925"/>
-            <a:ext cx="7019925" cy="804863"/>
+            <a:off x="457200" y="1331913"/>
+            <a:ext cx="11249025" cy="539750"/>
           </a:xfrm>
           <a:noFill/>
           <a:extLst>
@@ -6869,7 +6920,7 @@
           </a:extLst>
         </p:spPr>
         <p:txBody>
-          <a:bodyPr vert="horz" wrap="square" tIns="45720" rIns="91440" bIns="45720" numCol="1" anchor="t" anchorCtr="0" compatLnSpc="1">
+          <a:bodyPr vert="horz" wrap="square" tIns="45720" bIns="45720" numCol="1" compatLnSpc="1">
             <a:prstTxWarp prst="textNoShape">
               <a:avLst/>
             </a:prstTxWarp>
@@ -6877,9 +6928,65 @@
           <a:lstStyle/>
           <a:p>
             <a:pPr eaLnBrk="1" hangingPunct="1"/>
-            <a:endParaRPr lang="de-CH">
+            <a:r>
+              <a:rPr lang="de-CH" dirty="0">
+                <a:latin typeface="Lucida Sans" pitchFamily="34" charset="0"/>
+              </a:rPr>
+              <a:t>Werkzeuge</a:t>
+            </a:r>
+          </a:p>
+        </p:txBody>
+      </p:sp>
+      <p:sp>
+        <p:nvSpPr>
+          <p:cNvPr id="11268" name="Inhaltsplatzhalter 3"/>
+          <p:cNvSpPr>
+            <a:spLocks noGrp="1"/>
+          </p:cNvSpPr>
+          <p:nvPr>
+            <p:ph sz="half" idx="13"/>
+          </p:nvPr>
+        </p:nvSpPr>
+        <p:spPr bwMode="auto">
+          <a:xfrm>
+            <a:off x="457200" y="2160588"/>
+            <a:ext cx="11249025" cy="3959225"/>
+          </a:xfrm>
+          <a:noFill/>
+          <a:extLst>
+            <a:ext uri="{909E8E84-426E-40DD-AFC4-6F175D3DCCD1}">
+              <a14:hiddenFill xmlns:a14="http://schemas.microsoft.com/office/drawing/2010/main">
+                <a:solidFill>
+                  <a:srgbClr val="FFFFFF"/>
+                </a:solidFill>
+              </a14:hiddenFill>
+            </a:ext>
+            <a:ext uri="{91240B29-F687-4F45-9708-019B960494DF}">
+              <a14:hiddenLine xmlns:a14="http://schemas.microsoft.com/office/drawing/2010/main" w="9525">
+                <a:solidFill>
+                  <a:srgbClr val="000000"/>
+                </a:solidFill>
+                <a:miter lim="800000"/>
+                <a:headEnd/>
+                <a:tailEnd/>
+              </a14:hiddenLine>
+            </a:ext>
+          </a:extLst>
+        </p:spPr>
+        <p:txBody>
+          <a:bodyPr vert="horz" wrap="square" tIns="45720" bIns="45720" numCol="1" anchor="t" anchorCtr="0" compatLnSpc="1">
+            <a:prstTxWarp prst="textNoShape">
+              <a:avLst/>
+            </a:prstTxWarp>
+          </a:bodyPr>
+          <a:lstStyle/>
+          <a:p>
+            <a:pPr eaLnBrk="1" hangingPunct="1">
+              <a:buFont typeface="Lucida Grande" charset="0"/>
+              <a:buChar char="▶"/>
+            </a:pPr>
+            <a:endParaRPr lang="de-CH" dirty="0">
               <a:latin typeface="Lucida Sans" pitchFamily="34" charset="0"/>
-              <a:cs typeface="Lucida Sans Unicode" pitchFamily="34" charset="0"/>
             </a:endParaRPr>
           </a:p>
         </p:txBody>
@@ -6911,61 +7018,13 @@
       </p:grpSpPr>
       <p:sp>
         <p:nvSpPr>
-          <p:cNvPr id="10242" name="Inhaltsplatzhalter 1"/>
-          <p:cNvSpPr>
-            <a:spLocks noGrp="1"/>
-          </p:cNvSpPr>
-          <p:nvPr>
-            <p:ph sz="half" idx="1"/>
-          </p:nvPr>
-        </p:nvSpPr>
-        <p:spPr bwMode="auto">
-          <a:xfrm>
-            <a:off x="457200" y="1331913"/>
-            <a:ext cx="11249025" cy="4787900"/>
-          </a:xfrm>
-          <a:noFill/>
-          <a:extLst>
-            <a:ext uri="{909E8E84-426E-40DD-AFC4-6F175D3DCCD1}">
-              <a14:hiddenFill xmlns:a14="http://schemas.microsoft.com/office/drawing/2010/main">
-                <a:solidFill>
-                  <a:srgbClr val="FFFFFF"/>
-                </a:solidFill>
-              </a14:hiddenFill>
-            </a:ext>
-            <a:ext uri="{91240B29-F687-4F45-9708-019B960494DF}">
-              <a14:hiddenLine xmlns:a14="http://schemas.microsoft.com/office/drawing/2010/main" w="9525">
-                <a:solidFill>
-                  <a:srgbClr val="000000"/>
-                </a:solidFill>
-                <a:miter lim="800000"/>
-                <a:headEnd/>
-                <a:tailEnd/>
-              </a14:hiddenLine>
-            </a:ext>
-          </a:extLst>
-        </p:spPr>
-        <p:txBody>
-          <a:bodyPr vert="horz" wrap="square" tIns="45720" bIns="45720" numCol="1" anchor="t" anchorCtr="0" compatLnSpc="1">
-            <a:prstTxWarp prst="textNoShape">
-              <a:avLst/>
-            </a:prstTxWarp>
-          </a:bodyPr>
-          <a:lstStyle/>
-          <a:p>
-            <a:pPr eaLnBrk="1" hangingPunct="1">
-              <a:buFont typeface="Lucida Grande" charset="0"/>
-              <a:buChar char="▶"/>
-            </a:pPr>
-            <a:endParaRPr lang="de-CH">
-              <a:latin typeface="Lucida Sans" pitchFamily="34" charset="0"/>
-            </a:endParaRPr>
-          </a:p>
-        </p:txBody>
-      </p:sp>
-      <p:sp>
-        <p:nvSpPr>
-          <p:cNvPr id="10243" name="Titel 2"/>
+          <p:cNvPr id="2" name="Title 1">
+            <a:extLst>
+              <a:ext uri="{FF2B5EF4-FFF2-40B4-BE49-F238E27FC236}">
+                <a16:creationId xmlns:a16="http://schemas.microsoft.com/office/drawing/2014/main" id="{43F1A843-16F6-4B88-B0D2-55108B5609EF}"/>
+              </a:ext>
+            </a:extLst>
+          </p:cNvPr>
           <p:cNvSpPr>
             <a:spLocks noGrp="1"/>
           </p:cNvSpPr>
@@ -6973,51 +7032,77 @@
             <p:ph type="ctrTitle"/>
           </p:nvPr>
         </p:nvSpPr>
-        <p:spPr bwMode="auto">
-          <a:xfrm>
-            <a:off x="457200" y="360363"/>
-            <a:ext cx="11249025" cy="539750"/>
-          </a:xfrm>
-          <a:noFill/>
-          <a:extLst>
-            <a:ext uri="{909E8E84-426E-40DD-AFC4-6F175D3DCCD1}">
-              <a14:hiddenFill xmlns:a14="http://schemas.microsoft.com/office/drawing/2010/main">
-                <a:solidFill>
-                  <a:srgbClr val="FFFFFF"/>
-                </a:solidFill>
-              </a14:hiddenFill>
-            </a:ext>
-            <a:ext uri="{91240B29-F687-4F45-9708-019B960494DF}">
-              <a14:hiddenLine xmlns:a14="http://schemas.microsoft.com/office/drawing/2010/main" w="9525">
-                <a:solidFill>
-                  <a:srgbClr val="000000"/>
-                </a:solidFill>
-                <a:miter lim="800000"/>
-                <a:headEnd/>
-                <a:tailEnd/>
-              </a14:hiddenLine>
-            </a:ext>
-          </a:extLst>
-        </p:spPr>
-        <p:txBody>
-          <a:bodyPr vert="horz" wrap="square" tIns="45720" bIns="45720" numCol="1" anchor="t" anchorCtr="0" compatLnSpc="1">
-            <a:prstTxWarp prst="textNoShape">
-              <a:avLst/>
-            </a:prstTxWarp>
-          </a:bodyPr>
+        <p:spPr/>
+        <p:txBody>
+          <a:bodyPr/>
           <a:lstStyle/>
           <a:p>
-            <a:pPr eaLnBrk="1" hangingPunct="1"/>
-            <a:r>
-              <a:rPr lang="de-CH" dirty="0">
-                <a:latin typeface="Lucida Sans" pitchFamily="34" charset="0"/>
-              </a:rPr>
-              <a:t>Agenda</a:t>
-            </a:r>
+            <a:r>
+              <a:rPr lang="de-CH" dirty="0"/>
+              <a:t>Umsetzung</a:t>
+            </a:r>
+          </a:p>
+        </p:txBody>
+      </p:sp>
+      <p:sp>
+        <p:nvSpPr>
+          <p:cNvPr id="3" name="Text Placeholder 2">
+            <a:extLst>
+              <a:ext uri="{FF2B5EF4-FFF2-40B4-BE49-F238E27FC236}">
+                <a16:creationId xmlns:a16="http://schemas.microsoft.com/office/drawing/2014/main" id="{229BE666-8F2D-4FBE-91EF-C66CF785E14F}"/>
+              </a:ext>
+            </a:extLst>
+          </p:cNvPr>
+          <p:cNvSpPr>
+            <a:spLocks noGrp="1"/>
+          </p:cNvSpPr>
+          <p:nvPr>
+            <p:ph type="body" idx="1"/>
+          </p:nvPr>
+        </p:nvSpPr>
+        <p:spPr/>
+        <p:txBody>
+          <a:bodyPr/>
+          <a:lstStyle/>
+          <a:p>
+            <a:r>
+              <a:rPr lang="de-CH" dirty="0"/>
+              <a:t>Eigener Ansatz</a:t>
+            </a:r>
+          </a:p>
+        </p:txBody>
+      </p:sp>
+      <p:sp>
+        <p:nvSpPr>
+          <p:cNvPr id="4" name="Content Placeholder 3">
+            <a:extLst>
+              <a:ext uri="{FF2B5EF4-FFF2-40B4-BE49-F238E27FC236}">
+                <a16:creationId xmlns:a16="http://schemas.microsoft.com/office/drawing/2014/main" id="{796AB014-7955-40F3-9D50-4917701EAEB0}"/>
+              </a:ext>
+            </a:extLst>
+          </p:cNvPr>
+          <p:cNvSpPr>
+            <a:spLocks noGrp="1"/>
+          </p:cNvSpPr>
+          <p:nvPr>
+            <p:ph sz="half" idx="13"/>
+          </p:nvPr>
+        </p:nvSpPr>
+        <p:spPr/>
+        <p:txBody>
+          <a:bodyPr/>
+          <a:lstStyle/>
+          <a:p>
+            <a:endParaRPr lang="de-CH"/>
           </a:p>
         </p:txBody>
       </p:sp>
     </p:spTree>
+    <p:extLst>
+      <p:ext uri="{BB962C8B-B14F-4D97-AF65-F5344CB8AC3E}">
+        <p14:creationId xmlns:p14="http://schemas.microsoft.com/office/powerpoint/2010/main" val="86863747"/>
+      </p:ext>
+    </p:extLst>
   </p:cSld>
   <p:clrMapOvr>
     <a:masterClrMapping/>
@@ -7044,7 +7129,38 @@
       </p:grpSpPr>
       <p:sp>
         <p:nvSpPr>
-          <p:cNvPr id="11266" name="Titel 1"/>
+          <p:cNvPr id="5" name="Content Placeholder 4">
+            <a:extLst>
+              <a:ext uri="{FF2B5EF4-FFF2-40B4-BE49-F238E27FC236}">
+                <a16:creationId xmlns:a16="http://schemas.microsoft.com/office/drawing/2014/main" id="{7E0FB3B7-0EC5-48EE-AC0D-C086B3559FB6}"/>
+              </a:ext>
+            </a:extLst>
+          </p:cNvPr>
+          <p:cNvSpPr>
+            <a:spLocks noGrp="1"/>
+          </p:cNvSpPr>
+          <p:nvPr>
+            <p:ph sz="half" idx="1"/>
+          </p:nvPr>
+        </p:nvSpPr>
+        <p:spPr/>
+        <p:txBody>
+          <a:bodyPr/>
+          <a:lstStyle/>
+          <a:p>
+            <a:endParaRPr lang="de-CH" dirty="0"/>
+          </a:p>
+        </p:txBody>
+      </p:sp>
+      <p:sp>
+        <p:nvSpPr>
+          <p:cNvPr id="2" name="Title 1">
+            <a:extLst>
+              <a:ext uri="{FF2B5EF4-FFF2-40B4-BE49-F238E27FC236}">
+                <a16:creationId xmlns:a16="http://schemas.microsoft.com/office/drawing/2014/main" id="{21F65613-820C-45C6-9653-B77D519B1D33}"/>
+              </a:ext>
+            </a:extLst>
+          </p:cNvPr>
           <p:cNvSpPr>
             <a:spLocks noGrp="1"/>
           </p:cNvSpPr>
@@ -7052,53 +7168,94 @@
             <p:ph type="ctrTitle"/>
           </p:nvPr>
         </p:nvSpPr>
-        <p:spPr bwMode="auto">
-          <a:xfrm>
-            <a:off x="457200" y="360363"/>
-            <a:ext cx="11249025" cy="539750"/>
-          </a:xfrm>
-          <a:noFill/>
-          <a:extLst>
-            <a:ext uri="{909E8E84-426E-40DD-AFC4-6F175D3DCCD1}">
-              <a14:hiddenFill xmlns:a14="http://schemas.microsoft.com/office/drawing/2010/main">
-                <a:solidFill>
-                  <a:srgbClr val="FFFFFF"/>
-                </a:solidFill>
-              </a14:hiddenFill>
-            </a:ext>
-            <a:ext uri="{91240B29-F687-4F45-9708-019B960494DF}">
-              <a14:hiddenLine xmlns:a14="http://schemas.microsoft.com/office/drawing/2010/main" w="9525">
-                <a:solidFill>
-                  <a:srgbClr val="000000"/>
-                </a:solidFill>
-                <a:miter lim="800000"/>
-                <a:headEnd/>
-                <a:tailEnd/>
-              </a14:hiddenLine>
-            </a:ext>
-          </a:extLst>
-        </p:spPr>
-        <p:txBody>
-          <a:bodyPr vert="horz" wrap="square" tIns="45720" bIns="45720" numCol="1" anchor="t" anchorCtr="0" compatLnSpc="1">
-            <a:prstTxWarp prst="textNoShape">
-              <a:avLst/>
-            </a:prstTxWarp>
-          </a:bodyPr>
+        <p:spPr/>
+        <p:txBody>
+          <a:bodyPr/>
           <a:lstStyle/>
           <a:p>
-            <a:pPr eaLnBrk="1" hangingPunct="1"/>
-            <a:r>
-              <a:rPr lang="de-CH" dirty="0">
-                <a:latin typeface="Lucida Sans" pitchFamily="34" charset="0"/>
-              </a:rPr>
-              <a:t>Umsetzung</a:t>
-            </a:r>
-          </a:p>
-        </p:txBody>
-      </p:sp>
-      <p:sp>
-        <p:nvSpPr>
-          <p:cNvPr id="11267" name="Textplatzhalter 2"/>
+            <a:r>
+              <a:rPr lang="de-CH" dirty="0"/>
+              <a:t>Resultate</a:t>
+            </a:r>
+          </a:p>
+        </p:txBody>
+      </p:sp>
+    </p:spTree>
+    <p:extLst>
+      <p:ext uri="{BB962C8B-B14F-4D97-AF65-F5344CB8AC3E}">
+        <p14:creationId xmlns:p14="http://schemas.microsoft.com/office/powerpoint/2010/main" val="121251974"/>
+      </p:ext>
+    </p:extLst>
+  </p:cSld>
+  <p:clrMapOvr>
+    <a:masterClrMapping/>
+  </p:clrMapOvr>
+</p:sld>
+</file>
+
+<file path=ppt/slides/slide5.xml><?xml version="1.0" encoding="utf-8"?>
+<p:sld xmlns:a="http://schemas.openxmlformats.org/drawingml/2006/main" xmlns:r="http://schemas.openxmlformats.org/officeDocument/2006/relationships" xmlns:p="http://schemas.openxmlformats.org/presentationml/2006/main">
+  <p:cSld>
+    <p:spTree>
+      <p:nvGrpSpPr>
+        <p:cNvPr id="1" name=""/>
+        <p:cNvGrpSpPr/>
+        <p:nvPr/>
+      </p:nvGrpSpPr>
+      <p:grpSpPr>
+        <a:xfrm>
+          <a:off x="0" y="0"/>
+          <a:ext cx="0" cy="0"/>
+          <a:chOff x="0" y="0"/>
+          <a:chExt cx="0" cy="0"/>
+        </a:xfrm>
+      </p:grpSpPr>
+      <p:sp>
+        <p:nvSpPr>
+          <p:cNvPr id="2" name="Title 1">
+            <a:extLst>
+              <a:ext uri="{FF2B5EF4-FFF2-40B4-BE49-F238E27FC236}">
+                <a16:creationId xmlns:a16="http://schemas.microsoft.com/office/drawing/2014/main" id="{24561879-A391-4E68-9A8E-96CE98B5D9FA}"/>
+              </a:ext>
+            </a:extLst>
+          </p:cNvPr>
+          <p:cNvSpPr>
+            <a:spLocks noGrp="1"/>
+          </p:cNvSpPr>
+          <p:nvPr>
+            <p:ph type="ctrTitle"/>
+          </p:nvPr>
+        </p:nvSpPr>
+        <p:spPr/>
+        <p:txBody>
+          <a:bodyPr/>
+          <a:lstStyle/>
+          <a:p>
+            <a:r>
+              <a:rPr lang="de-CH" dirty="0" err="1"/>
+              <a:t>Lessons</a:t>
+            </a:r>
+            <a:r>
+              <a:rPr lang="de-CH" dirty="0"/>
+              <a:t> </a:t>
+            </a:r>
+            <a:r>
+              <a:rPr lang="de-CH" dirty="0" err="1"/>
+              <a:t>Learned</a:t>
+            </a:r>
+            <a:endParaRPr lang="de-CH" dirty="0"/>
+          </a:p>
+        </p:txBody>
+      </p:sp>
+      <p:sp>
+        <p:nvSpPr>
+          <p:cNvPr id="3" name="Text Placeholder 2">
+            <a:extLst>
+              <a:ext uri="{FF2B5EF4-FFF2-40B4-BE49-F238E27FC236}">
+                <a16:creationId xmlns:a16="http://schemas.microsoft.com/office/drawing/2014/main" id="{D1B4F945-E6F8-48F2-B339-3EED6A45519E}"/>
+              </a:ext>
+            </a:extLst>
+          </p:cNvPr>
           <p:cNvSpPr>
             <a:spLocks noGrp="1"/>
           </p:cNvSpPr>
@@ -7106,53 +7263,24 @@
             <p:ph type="body" idx="1"/>
           </p:nvPr>
         </p:nvSpPr>
-        <p:spPr bwMode="auto">
-          <a:xfrm>
-            <a:off x="457200" y="1331913"/>
-            <a:ext cx="11249025" cy="539750"/>
-          </a:xfrm>
-          <a:noFill/>
-          <a:extLst>
-            <a:ext uri="{909E8E84-426E-40DD-AFC4-6F175D3DCCD1}">
-              <a14:hiddenFill xmlns:a14="http://schemas.microsoft.com/office/drawing/2010/main">
-                <a:solidFill>
-                  <a:srgbClr val="FFFFFF"/>
-                </a:solidFill>
-              </a14:hiddenFill>
-            </a:ext>
-            <a:ext uri="{91240B29-F687-4F45-9708-019B960494DF}">
-              <a14:hiddenLine xmlns:a14="http://schemas.microsoft.com/office/drawing/2010/main" w="9525">
-                <a:solidFill>
-                  <a:srgbClr val="000000"/>
-                </a:solidFill>
-                <a:miter lim="800000"/>
-                <a:headEnd/>
-                <a:tailEnd/>
-              </a14:hiddenLine>
-            </a:ext>
-          </a:extLst>
-        </p:spPr>
-        <p:txBody>
-          <a:bodyPr vert="horz" wrap="square" tIns="45720" bIns="45720" numCol="1" compatLnSpc="1">
-            <a:prstTxWarp prst="textNoShape">
-              <a:avLst/>
-            </a:prstTxWarp>
-          </a:bodyPr>
+        <p:spPr/>
+        <p:txBody>
+          <a:bodyPr/>
           <a:lstStyle/>
           <a:p>
-            <a:pPr eaLnBrk="1" hangingPunct="1"/>
-            <a:r>
-              <a:rPr lang="de-CH" dirty="0">
-                <a:latin typeface="Lucida Sans" pitchFamily="34" charset="0"/>
-              </a:rPr>
-              <a:t>Untertitel</a:t>
-            </a:r>
-          </a:p>
-        </p:txBody>
-      </p:sp>
-      <p:sp>
-        <p:nvSpPr>
-          <p:cNvPr id="11268" name="Inhaltsplatzhalter 3"/>
+            <a:endParaRPr lang="de-CH"/>
+          </a:p>
+        </p:txBody>
+      </p:sp>
+      <p:sp>
+        <p:nvSpPr>
+          <p:cNvPr id="4" name="Content Placeholder 3">
+            <a:extLst>
+              <a:ext uri="{FF2B5EF4-FFF2-40B4-BE49-F238E27FC236}">
+                <a16:creationId xmlns:a16="http://schemas.microsoft.com/office/drawing/2014/main" id="{0BBB384E-CB9C-4C6A-944A-B406869C9886}"/>
+              </a:ext>
+            </a:extLst>
+          </p:cNvPr>
           <p:cNvSpPr>
             <a:spLocks noGrp="1"/>
           </p:cNvSpPr>
@@ -7160,51 +7288,21 @@
             <p:ph sz="half" idx="13"/>
           </p:nvPr>
         </p:nvSpPr>
-        <p:spPr bwMode="auto">
-          <a:xfrm>
-            <a:off x="457200" y="2160588"/>
-            <a:ext cx="11249025" cy="3959225"/>
-          </a:xfrm>
-          <a:noFill/>
-          <a:extLst>
-            <a:ext uri="{909E8E84-426E-40DD-AFC4-6F175D3DCCD1}">
-              <a14:hiddenFill xmlns:a14="http://schemas.microsoft.com/office/drawing/2010/main">
-                <a:solidFill>
-                  <a:srgbClr val="FFFFFF"/>
-                </a:solidFill>
-              </a14:hiddenFill>
-            </a:ext>
-            <a:ext uri="{91240B29-F687-4F45-9708-019B960494DF}">
-              <a14:hiddenLine xmlns:a14="http://schemas.microsoft.com/office/drawing/2010/main" w="9525">
-                <a:solidFill>
-                  <a:srgbClr val="000000"/>
-                </a:solidFill>
-                <a:miter lim="800000"/>
-                <a:headEnd/>
-                <a:tailEnd/>
-              </a14:hiddenLine>
-            </a:ext>
-          </a:extLst>
-        </p:spPr>
-        <p:txBody>
-          <a:bodyPr vert="horz" wrap="square" tIns="45720" bIns="45720" numCol="1" anchor="t" anchorCtr="0" compatLnSpc="1">
-            <a:prstTxWarp prst="textNoShape">
-              <a:avLst/>
-            </a:prstTxWarp>
-          </a:bodyPr>
+        <p:spPr/>
+        <p:txBody>
+          <a:bodyPr/>
           <a:lstStyle/>
           <a:p>
-            <a:pPr eaLnBrk="1" hangingPunct="1">
-              <a:buFont typeface="Lucida Grande" charset="0"/>
-              <a:buChar char="▶"/>
-            </a:pPr>
-            <a:endParaRPr lang="de-CH">
-              <a:latin typeface="Lucida Sans" pitchFamily="34" charset="0"/>
-            </a:endParaRPr>
+            <a:endParaRPr lang="de-CH"/>
           </a:p>
         </p:txBody>
       </p:sp>
     </p:spTree>
+    <p:extLst>
+      <p:ext uri="{BB962C8B-B14F-4D97-AF65-F5344CB8AC3E}">
+        <p14:creationId xmlns:p14="http://schemas.microsoft.com/office/powerpoint/2010/main" val="2428530631"/>
+      </p:ext>
+    </p:extLst>
   </p:cSld>
   <p:clrMapOvr>
     <a:masterClrMapping/>
@@ -7823,15 +7921,6 @@
 </file>
 
 <file path=customXml/item1.xml><?xml version="1.0" encoding="utf-8"?>
-<?mso-contentType ?>
-<FormTemplates xmlns="http://schemas.microsoft.com/sharepoint/v3/contenttype/forms">
-  <Display>DocumentLibraryForm</Display>
-  <Edit>DocumentLibraryForm</Edit>
-  <New>DocumentLibraryForm</New>
-</FormTemplates>
-</file>
-
-<file path=customXml/item2.xml><?xml version="1.0" encoding="utf-8"?>
 <ct:contentTypeSchema xmlns:ct="http://schemas.microsoft.com/office/2006/metadata/contentType" xmlns:ma="http://schemas.microsoft.com/office/2006/metadata/properties/metaAttributes" ct:_="" ma:_="" ma:contentTypeName="QMPilot_ContentType" ma:contentTypeID="0x0101009127C3B567804923A8661E062BBD8EF500AB8983C84EF542A7976DC8547A5CDC52001BD440F45714504284DA526949208683" ma:contentTypeVersion="2" ma:contentTypeDescription="Create a new document." ma:contentTypeScope="" ma:versionID="e95561030a1194bdd1903eaf06697dcb">
   <xsd:schema xmlns:xsd="http://www.w3.org/2001/XMLSchema" xmlns:xs="http://www.w3.org/2001/XMLSchema" xmlns:p="http://schemas.microsoft.com/office/2006/metadata/properties" xmlns:ns2="f6f68f68-5570-446d-b1e6-2310e70d83d3" xmlns:ns3="2551ef7e-3b29-44d1-a8ad-ef34c26bfc60" targetNamespace="http://schemas.microsoft.com/office/2006/metadata/properties" ma:root="true" ma:fieldsID="a12ba8f3cc9838c64a8c8804efb93033" ns2:_="" ns3:_="">
     <xsd:import namespace="f6f68f68-5570-446d-b1e6-2310e70d83d3"/>
@@ -7970,6 +8059,15 @@
 </ct:contentTypeSchema>
 </file>
 
+<file path=customXml/item2.xml><?xml version="1.0" encoding="utf-8"?>
+<?mso-contentType ?>
+<FormTemplates xmlns="http://schemas.microsoft.com/sharepoint/v3/contenttype/forms">
+  <Display>DocumentLibraryForm</Display>
+  <Edit>DocumentLibraryForm</Edit>
+  <New>DocumentLibraryForm</New>
+</FormTemplates>
+</file>
+
 <file path=customXml/item3.xml><?xml version="1.0" encoding="utf-8"?>
 <p:properties xmlns:p="http://schemas.microsoft.com/office/2006/metadata/properties" xmlns:xsi="http://www.w3.org/2001/XMLSchema-instance" xmlns:pc="http://schemas.microsoft.com/office/infopath/2007/PartnerControls">
   <documentManagement>
@@ -7987,14 +8085,6 @@
 </file>
 
 <file path=customXml/itemProps1.xml><?xml version="1.0" encoding="utf-8"?>
-<ds:datastoreItem xmlns:ds="http://schemas.openxmlformats.org/officeDocument/2006/customXml" ds:itemID="{3B108660-2CB9-4BF5-8E68-68C91CE7D9D8}">
-  <ds:schemaRefs>
-    <ds:schemaRef ds:uri="http://schemas.microsoft.com/sharepoint/v3/contenttype/forms"/>
-  </ds:schemaRefs>
-</ds:datastoreItem>
-</file>
-
-<file path=customXml/itemProps2.xml><?xml version="1.0" encoding="utf-8"?>
 <ds:datastoreItem xmlns:ds="http://schemas.openxmlformats.org/officeDocument/2006/customXml" ds:itemID="{17412572-CAAE-4A55-B1F7-111B37F547FD}">
   <ds:schemaRefs>
     <ds:schemaRef ds:uri="http://schemas.microsoft.com/office/2006/metadata/contentType"/>
@@ -8009,6 +8099,14 @@
     <ds:schemaRef ds:uri="http://purl.org/dc/elements/1.1/"/>
     <ds:schemaRef ds:uri="http://purl.org/dc/terms/"/>
     <ds:schemaRef ds:uri="http://schemas.microsoft.com/internal/obd"/>
+  </ds:schemaRefs>
+</ds:datastoreItem>
+</file>
+
+<file path=customXml/itemProps2.xml><?xml version="1.0" encoding="utf-8"?>
+<ds:datastoreItem xmlns:ds="http://schemas.openxmlformats.org/officeDocument/2006/customXml" ds:itemID="{3B108660-2CB9-4BF5-8E68-68C91CE7D9D8}">
+  <ds:schemaRefs>
+    <ds:schemaRef ds:uri="http://schemas.microsoft.com/sharepoint/v3/contenttype/forms"/>
   </ds:schemaRefs>
 </ds:datastoreItem>
 </file>

</xml_diff>